<commit_message>
Updating presentation for Week 02
</commit_message>
<xml_diff>
--- a/presentation/ch02-mapreduce.pptx
+++ b/presentation/ch02-mapreduce.pptx
@@ -273,7 +273,7 @@
             <a:fld id="{D3E28C4F-4FE9-4D22-93D8-487A4D01D983}" type="datetimeFigureOut">
               <a:rPr lang="en-US" smtClean="0"/>
               <a:pPr/>
-              <a:t>2/19/2016</a:t>
+              <a:t>2/17/2017</a:t>
             </a:fld>
             <a:endParaRPr lang="en-US"/>
           </a:p>
@@ -440,7 +440,7 @@
             <a:fld id="{EE18CB36-612C-4E4A-AC83-E89476AEC2BF}" type="datetimeFigureOut">
               <a:rPr lang="en-US" smtClean="0"/>
               <a:pPr/>
-              <a:t>2/19/2016</a:t>
+              <a:t>2/17/2017</a:t>
             </a:fld>
             <a:endParaRPr lang="en-US"/>
           </a:p>
@@ -1585,9 +1585,7 @@
         </p:style>
         <p:txBody>
           <a:bodyPr rtlCol="0" anchor="ctr"/>
-          <a:lstStyle>
-            <a:extLst/>
-          </a:lstStyle>
+          <a:lstStyle/>
           <a:p>
             <a:pPr algn="ctr" eaLnBrk="1" latinLnBrk="0" hangingPunct="1"/>
             <a:endParaRPr kumimoji="0" lang="en-US"/>
@@ -1773,7 +1771,7 @@
           <a:p>
             <a:fld id="{74E0B15C-66BF-4548-B9F7-ABFD8B692764}" type="datetime1">
               <a:rPr lang="en-US" smtClean="0"/>
-              <a:t>2/19/2016</a:t>
+              <a:t>2/17/2017</a:t>
             </a:fld>
             <a:endParaRPr lang="en-US"/>
           </a:p>
@@ -1871,9 +1869,7 @@
         </p:style>
         <p:txBody>
           <a:bodyPr rtlCol="0" anchor="ctr"/>
-          <a:lstStyle>
-            <a:extLst/>
-          </a:lstStyle>
+          <a:lstStyle/>
           <a:p>
             <a:pPr algn="ctr" eaLnBrk="1" latinLnBrk="0" hangingPunct="1"/>
             <a:endParaRPr kumimoji="0" lang="en-US"/>
@@ -1918,9 +1914,7 @@
         <p:spPr/>
         <p:txBody>
           <a:bodyPr/>
-          <a:lstStyle>
-            <a:extLst/>
-          </a:lstStyle>
+          <a:lstStyle/>
           <a:p>
             <a:r>
               <a:rPr kumimoji="0" lang="en-US" smtClean="0"/>
@@ -1943,9 +1937,7 @@
         <p:spPr/>
         <p:txBody>
           <a:bodyPr vert="eaVert"/>
-          <a:lstStyle>
-            <a:extLst/>
-          </a:lstStyle>
+          <a:lstStyle/>
           <a:p>
             <a:pPr lvl="0" eaLnBrk="1" latinLnBrk="0" hangingPunct="1"/>
             <a:r>
@@ -2001,7 +1993,7 @@
           <a:p>
             <a:fld id="{587E39B9-8394-4A3F-AE29-D25E40635A66}" type="datetime1">
               <a:rPr lang="en-US" smtClean="0"/>
-              <a:t>2/19/2016</a:t>
+              <a:t>2/17/2017</a:t>
             </a:fld>
             <a:endParaRPr lang="en-US"/>
           </a:p>
@@ -2124,9 +2116,7 @@
         </p:style>
         <p:txBody>
           <a:bodyPr rtlCol="0" anchor="ctr"/>
-          <a:lstStyle>
-            <a:extLst/>
-          </a:lstStyle>
+          <a:lstStyle/>
           <a:p>
             <a:pPr algn="ctr" eaLnBrk="1" latinLnBrk="0" hangingPunct="1"/>
             <a:endParaRPr kumimoji="0" lang="en-US"/>
@@ -2171,9 +2161,7 @@
         </p:style>
         <p:txBody>
           <a:bodyPr rtlCol="0" anchor="ctr"/>
-          <a:lstStyle>
-            <a:extLst/>
-          </a:lstStyle>
+          <a:lstStyle/>
           <a:p>
             <a:pPr algn="ctr" eaLnBrk="1" latinLnBrk="0" hangingPunct="1"/>
             <a:endParaRPr kumimoji="0" lang="en-US"/>
@@ -2198,9 +2186,7 @@
         </p:spPr>
         <p:txBody>
           <a:bodyPr vert="eaVert"/>
-          <a:lstStyle>
-            <a:extLst/>
-          </a:lstStyle>
+          <a:lstStyle/>
           <a:p>
             <a:r>
               <a:rPr kumimoji="0" lang="en-US" smtClean="0"/>
@@ -2228,9 +2214,7 @@
         </p:spPr>
         <p:txBody>
           <a:bodyPr vert="eaVert"/>
-          <a:lstStyle>
-            <a:extLst/>
-          </a:lstStyle>
+          <a:lstStyle/>
           <a:p>
             <a:pPr lvl="0" eaLnBrk="1" latinLnBrk="0" hangingPunct="1"/>
             <a:r>
@@ -2286,7 +2270,7 @@
           <a:p>
             <a:fld id="{6E89BE1B-109A-4A1E-A524-238B7EF05396}" type="datetime1">
               <a:rPr lang="en-US" smtClean="0"/>
-              <a:t>2/19/2016</a:t>
+              <a:t>2/17/2017</a:t>
             </a:fld>
             <a:endParaRPr lang="en-US"/>
           </a:p>
@@ -2504,7 +2488,7 @@
           <a:p>
             <a:fld id="{8B8FAD7C-9E74-490A-9976-CEAC407DBF81}" type="datetime1">
               <a:rPr lang="en-US" smtClean="0"/>
-              <a:t>2/19/2016</a:t>
+              <a:t>2/17/2017</a:t>
             </a:fld>
             <a:endParaRPr lang="en-GB"/>
           </a:p>
@@ -2768,7 +2752,7 @@
           <a:p>
             <a:fld id="{8667AA6D-B4FD-46B1-B3E9-B042C52C85A2}" type="datetime1">
               <a:rPr lang="en-US" smtClean="0"/>
-              <a:t>2/19/2016</a:t>
+              <a:t>2/17/2017</a:t>
             </a:fld>
             <a:endParaRPr lang="en-US"/>
           </a:p>
@@ -2887,9 +2871,7 @@
         </p:spPr>
         <p:txBody>
           <a:bodyPr/>
-          <a:lstStyle>
-            <a:extLst/>
-          </a:lstStyle>
+          <a:lstStyle/>
           <a:p>
             <a:r>
               <a:rPr kumimoji="0" lang="en-US" smtClean="0"/>
@@ -2912,9 +2894,7 @@
         <p:spPr/>
         <p:txBody>
           <a:bodyPr/>
-          <a:lstStyle>
-            <a:extLst/>
-          </a:lstStyle>
+          <a:lstStyle/>
           <a:p>
             <a:pPr lvl="0" eaLnBrk="1" latinLnBrk="0" hangingPunct="1"/>
             <a:r>
@@ -2970,7 +2950,7 @@
           <a:p>
             <a:fld id="{649A1004-7A34-4C69-A29F-7848CCE72792}" type="datetime1">
               <a:rPr lang="en-US" smtClean="0"/>
-              <a:t>2/19/2016</a:t>
+              <a:t>2/17/2017</a:t>
             </a:fld>
             <a:endParaRPr lang="en-US"/>
           </a:p>
@@ -3091,9 +3071,7 @@
         </p:style>
         <p:txBody>
           <a:bodyPr rtlCol="0" anchor="ctr"/>
-          <a:lstStyle>
-            <a:extLst/>
-          </a:lstStyle>
+          <a:lstStyle/>
           <a:p>
             <a:pPr algn="ctr" eaLnBrk="1" latinLnBrk="0" hangingPunct="1"/>
             <a:endParaRPr kumimoji="0" lang="en-US"/>
@@ -3145,9 +3123,7 @@
         </p:style>
         <p:txBody>
           <a:bodyPr rtlCol="0" anchor="ctr"/>
-          <a:lstStyle>
-            <a:extLst/>
-          </a:lstStyle>
+          <a:lstStyle/>
           <a:p>
             <a:pPr algn="ctr" eaLnBrk="1" latinLnBrk="0" hangingPunct="1"/>
             <a:endParaRPr kumimoji="0" lang="en-US"/>
@@ -3335,7 +3311,7 @@
           <a:p>
             <a:fld id="{27D1924C-0E5F-41F9-9EF2-A30D8DD943B5}" type="datetime1">
               <a:rPr lang="en-US" smtClean="0"/>
-              <a:t>2/19/2016</a:t>
+              <a:t>2/17/2017</a:t>
             </a:fld>
             <a:endParaRPr lang="en-US"/>
           </a:p>
@@ -3426,9 +3402,7 @@
         <p:spPr/>
         <p:txBody>
           <a:bodyPr/>
-          <a:lstStyle>
-            <a:extLst/>
-          </a:lstStyle>
+          <a:lstStyle/>
           <a:p>
             <a:r>
               <a:rPr kumimoji="0" lang="en-US" smtClean="0"/>
@@ -3627,7 +3601,7 @@
           <a:p>
             <a:fld id="{CBD3F3B2-6969-4711-938A-F55A29B51480}" type="datetime1">
               <a:rPr lang="en-US" smtClean="0"/>
-              <a:t>2/19/2016</a:t>
+              <a:t>2/17/2017</a:t>
             </a:fld>
             <a:endParaRPr lang="en-US"/>
           </a:p>
@@ -4054,7 +4028,7 @@
           <a:p>
             <a:fld id="{D538DACF-DAC8-4C22-99F4-5AC8B8C6B7F9}" type="datetime1">
               <a:rPr lang="en-US" smtClean="0"/>
-              <a:t>2/19/2016</a:t>
+              <a:t>2/17/2017</a:t>
             </a:fld>
             <a:endParaRPr lang="en-US"/>
           </a:p>
@@ -4145,9 +4119,7 @@
         <p:spPr/>
         <p:txBody>
           <a:bodyPr/>
-          <a:lstStyle>
-            <a:extLst/>
-          </a:lstStyle>
+          <a:lstStyle/>
           <a:p>
             <a:r>
               <a:rPr kumimoji="0" lang="en-US" smtClean="0"/>
@@ -4174,7 +4146,7 @@
           <a:p>
             <a:fld id="{50F84880-51F2-491D-B30A-1FC47B871D77}" type="datetime1">
               <a:rPr lang="en-US" smtClean="0"/>
-              <a:t>2/19/2016</a:t>
+              <a:t>2/17/2017</a:t>
             </a:fld>
             <a:endParaRPr lang="en-US"/>
           </a:p>
@@ -4269,7 +4241,7 @@
           <a:p>
             <a:fld id="{D5DC6C30-2214-40E2-AEE5-9AE66D1057D0}" type="datetime1">
               <a:rPr lang="en-US" smtClean="0"/>
-              <a:t>2/19/2016</a:t>
+              <a:t>2/17/2017</a:t>
             </a:fld>
             <a:endParaRPr lang="en-US"/>
           </a:p>
@@ -4552,7 +4524,7 @@
           <a:p>
             <a:fld id="{BC6C5491-B905-4984-8643-1B7C9312C1C7}" type="datetime1">
               <a:rPr lang="en-US" smtClean="0"/>
-              <a:t>2/19/2016</a:t>
+              <a:t>2/17/2017</a:t>
             </a:fld>
             <a:endParaRPr lang="en-US"/>
           </a:p>
@@ -4643,9 +4615,7 @@
         </p:style>
         <p:txBody>
           <a:bodyPr rtlCol="0" anchor="ctr"/>
-          <a:lstStyle>
-            <a:extLst/>
-          </a:lstStyle>
+          <a:lstStyle/>
           <a:p>
             <a:pPr algn="ctr" eaLnBrk="1" latinLnBrk="0" hangingPunct="1"/>
             <a:endParaRPr kumimoji="0" lang="en-US"/>
@@ -4690,9 +4660,7 @@
         </p:style>
         <p:txBody>
           <a:bodyPr rtlCol="0" anchor="ctr"/>
-          <a:lstStyle>
-            <a:extLst/>
-          </a:lstStyle>
+          <a:lstStyle/>
           <a:p>
             <a:pPr algn="ctr" eaLnBrk="1" latinLnBrk="0" hangingPunct="1"/>
             <a:endParaRPr kumimoji="0" lang="en-US"/>
@@ -4923,7 +4891,7 @@
           <a:p>
             <a:fld id="{0D1BAC21-6A2B-4248-BF0F-2BED273A4141}" type="datetime1">
               <a:rPr lang="en-US" smtClean="0"/>
-              <a:t>2/19/2016</a:t>
+              <a:t>2/17/2017</a:t>
             </a:fld>
             <a:endParaRPr lang="en-US"/>
           </a:p>
@@ -4967,9 +4935,7 @@
         </p:style>
         <p:txBody>
           <a:bodyPr rtlCol="0" anchor="ctr"/>
-          <a:lstStyle>
-            <a:extLst/>
-          </a:lstStyle>
+          <a:lstStyle/>
           <a:p>
             <a:pPr algn="ctr" eaLnBrk="1" latinLnBrk="0" hangingPunct="1"/>
             <a:endParaRPr kumimoji="0" lang="en-US"/>
@@ -5014,9 +4980,7 @@
         </p:style>
         <p:txBody>
           <a:bodyPr rtlCol="0" anchor="ctr"/>
-          <a:lstStyle>
-            <a:extLst/>
-          </a:lstStyle>
+          <a:lstStyle/>
           <a:p>
             <a:pPr algn="ctr" eaLnBrk="1" latinLnBrk="0" hangingPunct="1"/>
             <a:endParaRPr kumimoji="0" lang="en-US"/>
@@ -5165,9 +5129,7 @@
         </p:style>
         <p:txBody>
           <a:bodyPr rtlCol="0" anchor="ctr"/>
-          <a:lstStyle>
-            <a:extLst/>
-          </a:lstStyle>
+          <a:lstStyle/>
           <a:p>
             <a:pPr algn="ctr" eaLnBrk="1" latinLnBrk="0" hangingPunct="1"/>
             <a:endParaRPr kumimoji="0" lang="en-US"/>
@@ -5212,9 +5174,7 @@
         </p:style>
         <p:txBody>
           <a:bodyPr rtlCol="0" anchor="ctr"/>
-          <a:lstStyle>
-            <a:extLst/>
-          </a:lstStyle>
+          <a:lstStyle/>
           <a:p>
             <a:pPr algn="ctr" eaLnBrk="1" latinLnBrk="0" hangingPunct="1"/>
             <a:endParaRPr kumimoji="0" lang="en-US"/>
@@ -5253,9 +5213,7 @@
               <a:bevelT w="50800" h="10160"/>
             </a:sp3d>
           </a:bodyPr>
-          <a:lstStyle>
-            <a:extLst/>
-          </a:lstStyle>
+          <a:lstStyle/>
           <a:p>
             <a:r>
               <a:rPr kumimoji="0" lang="en-US" dirty="0" smtClean="0"/>
@@ -5288,9 +5246,7 @@
           <a:bodyPr vert="horz" lIns="54864" tIns="91440" rtlCol="0">
             <a:normAutofit/>
           </a:bodyPr>
-          <a:lstStyle>
-            <a:extLst/>
-          </a:lstStyle>
+          <a:lstStyle/>
           <a:p>
             <a:pPr lvl="0" eaLnBrk="1" latinLnBrk="0" hangingPunct="1"/>
             <a:r>
@@ -5367,7 +5323,7 @@
           <a:p>
             <a:fld id="{C998EF77-6613-48F2-974F-C60E70302254}" type="datetime1">
               <a:rPr lang="en-US" smtClean="0"/>
-              <a:t>2/19/2016</a:t>
+              <a:t>2/17/2017</a:t>
             </a:fld>
             <a:endParaRPr lang="en-US"/>
           </a:p>
@@ -24775,8 +24731,20 @@
                 <a:tableStyleId>{073A0DAA-6AF3-43AB-8588-CEC1D06C72B9}</a:tableStyleId>
               </a:tblPr>
               <a:tblGrid>
-                <a:gridCol w="1104900"/>
-                <a:gridCol w="1104900"/>
+                <a:gridCol w="1104900">
+                  <a:extLst>
+                    <a:ext uri="{9D8B030D-6E8A-4147-A177-3AD203B41FA5}">
+                      <a16:colId xmlns:a16="http://schemas.microsoft.com/office/drawing/2014/main" val="20000"/>
+                    </a:ext>
+                  </a:extLst>
+                </a:gridCol>
+                <a:gridCol w="1104900">
+                  <a:extLst>
+                    <a:ext uri="{9D8B030D-6E8A-4147-A177-3AD203B41FA5}">
+                      <a16:colId xmlns:a16="http://schemas.microsoft.com/office/drawing/2014/main" val="20001"/>
+                    </a:ext>
+                  </a:extLst>
+                </a:gridCol>
               </a:tblGrid>
               <a:tr h="370840">
                 <a:tc>
@@ -24821,6 +24789,11 @@
                   </a:txBody>
                   <a:tcPr/>
                 </a:tc>
+                <a:extLst>
+                  <a:ext uri="{0D108BD9-81ED-4DB2-BD59-A6C34878D82A}">
+                    <a16:rowId xmlns:a16="http://schemas.microsoft.com/office/drawing/2014/main" val="10000"/>
+                  </a:ext>
+                </a:extLst>
               </a:tr>
               <a:tr h="370840">
                 <a:tc>
@@ -24879,6 +24852,11 @@
                   </a:txBody>
                   <a:tcPr/>
                 </a:tc>
+                <a:extLst>
+                  <a:ext uri="{0D108BD9-81ED-4DB2-BD59-A6C34878D82A}">
+                    <a16:rowId xmlns:a16="http://schemas.microsoft.com/office/drawing/2014/main" val="10001"/>
+                  </a:ext>
+                </a:extLst>
               </a:tr>
               <a:tr h="370840">
                 <a:tc>
@@ -24933,6 +24911,11 @@
                   </a:txBody>
                   <a:tcPr/>
                 </a:tc>
+                <a:extLst>
+                  <a:ext uri="{0D108BD9-81ED-4DB2-BD59-A6C34878D82A}">
+                    <a16:rowId xmlns:a16="http://schemas.microsoft.com/office/drawing/2014/main" val="10002"/>
+                  </a:ext>
+                </a:extLst>
               </a:tr>
               <a:tr h="370840">
                 <a:tc>
@@ -24987,6 +24970,11 @@
                   </a:txBody>
                   <a:tcPr/>
                 </a:tc>
+                <a:extLst>
+                  <a:ext uri="{0D108BD9-81ED-4DB2-BD59-A6C34878D82A}">
+                    <a16:rowId xmlns:a16="http://schemas.microsoft.com/office/drawing/2014/main" val="10003"/>
+                  </a:ext>
+                </a:extLst>
               </a:tr>
               <a:tr h="370840">
                 <a:tc>
@@ -25041,6 +25029,11 @@
                   </a:txBody>
                   <a:tcPr/>
                 </a:tc>
+                <a:extLst>
+                  <a:ext uri="{0D108BD9-81ED-4DB2-BD59-A6C34878D82A}">
+                    <a16:rowId xmlns:a16="http://schemas.microsoft.com/office/drawing/2014/main" val="10004"/>
+                  </a:ext>
+                </a:extLst>
               </a:tr>
             </a:tbl>
           </a:graphicData>
@@ -25071,8 +25064,20 @@
                 <a:tableStyleId>{073A0DAA-6AF3-43AB-8588-CEC1D06C72B9}</a:tableStyleId>
               </a:tblPr>
               <a:tblGrid>
-                <a:gridCol w="1104900"/>
-                <a:gridCol w="1104900"/>
+                <a:gridCol w="1104900">
+                  <a:extLst>
+                    <a:ext uri="{9D8B030D-6E8A-4147-A177-3AD203B41FA5}">
+                      <a16:colId xmlns:a16="http://schemas.microsoft.com/office/drawing/2014/main" val="20000"/>
+                    </a:ext>
+                  </a:extLst>
+                </a:gridCol>
+                <a:gridCol w="1104900">
+                  <a:extLst>
+                    <a:ext uri="{9D8B030D-6E8A-4147-A177-3AD203B41FA5}">
+                      <a16:colId xmlns:a16="http://schemas.microsoft.com/office/drawing/2014/main" val="20001"/>
+                    </a:ext>
+                  </a:extLst>
+                </a:gridCol>
               </a:tblGrid>
               <a:tr h="370840">
                 <a:tc>
@@ -25117,6 +25122,11 @@
                   </a:txBody>
                   <a:tcPr/>
                 </a:tc>
+                <a:extLst>
+                  <a:ext uri="{0D108BD9-81ED-4DB2-BD59-A6C34878D82A}">
+                    <a16:rowId xmlns:a16="http://schemas.microsoft.com/office/drawing/2014/main" val="10000"/>
+                  </a:ext>
+                </a:extLst>
               </a:tr>
               <a:tr h="370840">
                 <a:tc>
@@ -25175,6 +25185,11 @@
                   </a:txBody>
                   <a:tcPr/>
                 </a:tc>
+                <a:extLst>
+                  <a:ext uri="{0D108BD9-81ED-4DB2-BD59-A6C34878D82A}">
+                    <a16:rowId xmlns:a16="http://schemas.microsoft.com/office/drawing/2014/main" val="10001"/>
+                  </a:ext>
+                </a:extLst>
               </a:tr>
               <a:tr h="370840">
                 <a:tc>
@@ -25229,6 +25244,11 @@
                   </a:txBody>
                   <a:tcPr/>
                 </a:tc>
+                <a:extLst>
+                  <a:ext uri="{0D108BD9-81ED-4DB2-BD59-A6C34878D82A}">
+                    <a16:rowId xmlns:a16="http://schemas.microsoft.com/office/drawing/2014/main" val="10002"/>
+                  </a:ext>
+                </a:extLst>
               </a:tr>
               <a:tr h="370840">
                 <a:tc>
@@ -25283,6 +25303,11 @@
                   </a:txBody>
                   <a:tcPr/>
                 </a:tc>
+                <a:extLst>
+                  <a:ext uri="{0D108BD9-81ED-4DB2-BD59-A6C34878D82A}">
+                    <a16:rowId xmlns:a16="http://schemas.microsoft.com/office/drawing/2014/main" val="10003"/>
+                  </a:ext>
+                </a:extLst>
               </a:tr>
             </a:tbl>
           </a:graphicData>
@@ -25341,8 +25366,20 @@
                 <a:tableStyleId>{073A0DAA-6AF3-43AB-8588-CEC1D06C72B9}</a:tableStyleId>
               </a:tblPr>
               <a:tblGrid>
-                <a:gridCol w="1104900"/>
-                <a:gridCol w="1104900"/>
+                <a:gridCol w="1104900">
+                  <a:extLst>
+                    <a:ext uri="{9D8B030D-6E8A-4147-A177-3AD203B41FA5}">
+                      <a16:colId xmlns:a16="http://schemas.microsoft.com/office/drawing/2014/main" val="20000"/>
+                    </a:ext>
+                  </a:extLst>
+                </a:gridCol>
+                <a:gridCol w="1104900">
+                  <a:extLst>
+                    <a:ext uri="{9D8B030D-6E8A-4147-A177-3AD203B41FA5}">
+                      <a16:colId xmlns:a16="http://schemas.microsoft.com/office/drawing/2014/main" val="20001"/>
+                    </a:ext>
+                  </a:extLst>
+                </a:gridCol>
               </a:tblGrid>
               <a:tr h="370840">
                 <a:tc>
@@ -25387,6 +25424,11 @@
                   </a:txBody>
                   <a:tcPr/>
                 </a:tc>
+                <a:extLst>
+                  <a:ext uri="{0D108BD9-81ED-4DB2-BD59-A6C34878D82A}">
+                    <a16:rowId xmlns:a16="http://schemas.microsoft.com/office/drawing/2014/main" val="10000"/>
+                  </a:ext>
+                </a:extLst>
               </a:tr>
               <a:tr h="370840">
                 <a:tc>
@@ -25445,6 +25487,11 @@
                   </a:txBody>
                   <a:tcPr/>
                 </a:tc>
+                <a:extLst>
+                  <a:ext uri="{0D108BD9-81ED-4DB2-BD59-A6C34878D82A}">
+                    <a16:rowId xmlns:a16="http://schemas.microsoft.com/office/drawing/2014/main" val="10001"/>
+                  </a:ext>
+                </a:extLst>
               </a:tr>
               <a:tr h="370840">
                 <a:tc>
@@ -25499,6 +25546,11 @@
                   </a:txBody>
                   <a:tcPr/>
                 </a:tc>
+                <a:extLst>
+                  <a:ext uri="{0D108BD9-81ED-4DB2-BD59-A6C34878D82A}">
+                    <a16:rowId xmlns:a16="http://schemas.microsoft.com/office/drawing/2014/main" val="10002"/>
+                  </a:ext>
+                </a:extLst>
               </a:tr>
               <a:tr h="370840">
                 <a:tc>
@@ -25553,6 +25605,11 @@
                   </a:txBody>
                   <a:tcPr/>
                 </a:tc>
+                <a:extLst>
+                  <a:ext uri="{0D108BD9-81ED-4DB2-BD59-A6C34878D82A}">
+                    <a16:rowId xmlns:a16="http://schemas.microsoft.com/office/drawing/2014/main" val="10003"/>
+                  </a:ext>
+                </a:extLst>
               </a:tr>
             </a:tbl>
           </a:graphicData>

</xml_diff>